<commit_message>
opdatering af diagrammer efter vejledermøde, og opdatering af Nunit test i WPF efter tilrættelser med API controlleren i CC-Web
</commit_message>
<xml_diff>
--- a/Diagrammer/ArkitekturLag.pptx
+++ b/Diagrammer/ArkitekturLag.pptx
@@ -259,7 +259,7 @@
           <a:p>
             <a:fld id="{6BCE9E26-9F02-4BA6-887B-D1EB56C9ABD3}" type="datetimeFigureOut">
               <a:rPr lang="da-DK" smtClean="0"/>
-              <a:t>14-10-2021</a:t>
+              <a:t>08-12-2021</a:t>
             </a:fld>
             <a:endParaRPr lang="da-DK"/>
           </a:p>
@@ -457,7 +457,7 @@
           <a:p>
             <a:fld id="{6BCE9E26-9F02-4BA6-887B-D1EB56C9ABD3}" type="datetimeFigureOut">
               <a:rPr lang="da-DK" smtClean="0"/>
-              <a:t>14-10-2021</a:t>
+              <a:t>08-12-2021</a:t>
             </a:fld>
             <a:endParaRPr lang="da-DK"/>
           </a:p>
@@ -665,7 +665,7 @@
           <a:p>
             <a:fld id="{6BCE9E26-9F02-4BA6-887B-D1EB56C9ABD3}" type="datetimeFigureOut">
               <a:rPr lang="da-DK" smtClean="0"/>
-              <a:t>14-10-2021</a:t>
+              <a:t>08-12-2021</a:t>
             </a:fld>
             <a:endParaRPr lang="da-DK"/>
           </a:p>
@@ -863,7 +863,7 @@
           <a:p>
             <a:fld id="{6BCE9E26-9F02-4BA6-887B-D1EB56C9ABD3}" type="datetimeFigureOut">
               <a:rPr lang="da-DK" smtClean="0"/>
-              <a:t>14-10-2021</a:t>
+              <a:t>08-12-2021</a:t>
             </a:fld>
             <a:endParaRPr lang="da-DK"/>
           </a:p>
@@ -1138,7 +1138,7 @@
           <a:p>
             <a:fld id="{6BCE9E26-9F02-4BA6-887B-D1EB56C9ABD3}" type="datetimeFigureOut">
               <a:rPr lang="da-DK" smtClean="0"/>
-              <a:t>14-10-2021</a:t>
+              <a:t>08-12-2021</a:t>
             </a:fld>
             <a:endParaRPr lang="da-DK"/>
           </a:p>
@@ -1403,7 +1403,7 @@
           <a:p>
             <a:fld id="{6BCE9E26-9F02-4BA6-887B-D1EB56C9ABD3}" type="datetimeFigureOut">
               <a:rPr lang="da-DK" smtClean="0"/>
-              <a:t>14-10-2021</a:t>
+              <a:t>08-12-2021</a:t>
             </a:fld>
             <a:endParaRPr lang="da-DK"/>
           </a:p>
@@ -1815,7 +1815,7 @@
           <a:p>
             <a:fld id="{6BCE9E26-9F02-4BA6-887B-D1EB56C9ABD3}" type="datetimeFigureOut">
               <a:rPr lang="da-DK" smtClean="0"/>
-              <a:t>14-10-2021</a:t>
+              <a:t>08-12-2021</a:t>
             </a:fld>
             <a:endParaRPr lang="da-DK"/>
           </a:p>
@@ -1956,7 +1956,7 @@
           <a:p>
             <a:fld id="{6BCE9E26-9F02-4BA6-887B-D1EB56C9ABD3}" type="datetimeFigureOut">
               <a:rPr lang="da-DK" smtClean="0"/>
-              <a:t>14-10-2021</a:t>
+              <a:t>08-12-2021</a:t>
             </a:fld>
             <a:endParaRPr lang="da-DK"/>
           </a:p>
@@ -2069,7 +2069,7 @@
           <a:p>
             <a:fld id="{6BCE9E26-9F02-4BA6-887B-D1EB56C9ABD3}" type="datetimeFigureOut">
               <a:rPr lang="da-DK" smtClean="0"/>
-              <a:t>14-10-2021</a:t>
+              <a:t>08-12-2021</a:t>
             </a:fld>
             <a:endParaRPr lang="da-DK"/>
           </a:p>
@@ -2380,7 +2380,7 @@
           <a:p>
             <a:fld id="{6BCE9E26-9F02-4BA6-887B-D1EB56C9ABD3}" type="datetimeFigureOut">
               <a:rPr lang="da-DK" smtClean="0"/>
-              <a:t>14-10-2021</a:t>
+              <a:t>08-12-2021</a:t>
             </a:fld>
             <a:endParaRPr lang="da-DK"/>
           </a:p>
@@ -2668,7 +2668,7 @@
           <a:p>
             <a:fld id="{6BCE9E26-9F02-4BA6-887B-D1EB56C9ABD3}" type="datetimeFigureOut">
               <a:rPr lang="da-DK" smtClean="0"/>
-              <a:t>14-10-2021</a:t>
+              <a:t>08-12-2021</a:t>
             </a:fld>
             <a:endParaRPr lang="da-DK"/>
           </a:p>
@@ -2909,7 +2909,7 @@
           <a:p>
             <a:fld id="{6BCE9E26-9F02-4BA6-887B-D1EB56C9ABD3}" type="datetimeFigureOut">
               <a:rPr lang="da-DK" smtClean="0"/>
-              <a:t>14-10-2021</a:t>
+              <a:t>08-12-2021</a:t>
             </a:fld>
             <a:endParaRPr lang="da-DK"/>
           </a:p>
@@ -5418,1104 +5418,6 @@
           </p:txBody>
         </p:sp>
       </p:grpSp>
-      <p:grpSp>
-        <p:nvGrpSpPr>
-          <p:cNvPr id="47" name="Grafik 10" descr="Processor kontur">
-            <a:extLst>
-              <a:ext uri="{FF2B5EF4-FFF2-40B4-BE49-F238E27FC236}">
-                <a16:creationId xmlns:a16="http://schemas.microsoft.com/office/drawing/2014/main" id="{0F03D082-BE0F-4E8D-A311-7A52FA93C08C}"/>
-              </a:ext>
-            </a:extLst>
-          </p:cNvPr>
-          <p:cNvGrpSpPr/>
-          <p:nvPr/>
-        </p:nvGrpSpPr>
-        <p:grpSpPr>
-          <a:xfrm>
-            <a:off x="4585625" y="2485382"/>
-            <a:ext cx="853287" cy="853287"/>
-            <a:chOff x="4585625" y="2485382"/>
-            <a:chExt cx="853287" cy="853287"/>
-          </a:xfrm>
-          <a:solidFill>
-            <a:schemeClr val="accent6"/>
-          </a:solidFill>
-        </p:grpSpPr>
-        <p:sp>
-          <p:nvSpPr>
-            <p:cNvPr id="48" name="Kombinationstegning: figur 47">
-              <a:extLst>
-                <a:ext uri="{FF2B5EF4-FFF2-40B4-BE49-F238E27FC236}">
-                  <a16:creationId xmlns:a16="http://schemas.microsoft.com/office/drawing/2014/main" id="{6F2116A7-D818-4C24-AF55-B27600602397}"/>
-                </a:ext>
-              </a:extLst>
-            </p:cNvPr>
-            <p:cNvSpPr/>
-            <p:nvPr/>
-          </p:nvSpPr>
-          <p:spPr>
-            <a:xfrm>
-              <a:off x="4810798" y="2710555"/>
-              <a:ext cx="402941" cy="402941"/>
-            </a:xfrm>
-            <a:custGeom>
-              <a:avLst/>
-              <a:gdLst>
-                <a:gd name="connsiteX0" fmla="*/ 0 w 402941"/>
-                <a:gd name="connsiteY0" fmla="*/ 402941 h 402941"/>
-                <a:gd name="connsiteX1" fmla="*/ 402941 w 402941"/>
-                <a:gd name="connsiteY1" fmla="*/ 402941 h 402941"/>
-                <a:gd name="connsiteX2" fmla="*/ 402941 w 402941"/>
-                <a:gd name="connsiteY2" fmla="*/ 0 h 402941"/>
-                <a:gd name="connsiteX3" fmla="*/ 0 w 402941"/>
-                <a:gd name="connsiteY3" fmla="*/ 0 h 402941"/>
-                <a:gd name="connsiteX4" fmla="*/ 23702 w 402941"/>
-                <a:gd name="connsiteY4" fmla="*/ 23702 h 402941"/>
-                <a:gd name="connsiteX5" fmla="*/ 379239 w 402941"/>
-                <a:gd name="connsiteY5" fmla="*/ 23702 h 402941"/>
-                <a:gd name="connsiteX6" fmla="*/ 379239 w 402941"/>
-                <a:gd name="connsiteY6" fmla="*/ 379239 h 402941"/>
-                <a:gd name="connsiteX7" fmla="*/ 23702 w 402941"/>
-                <a:gd name="connsiteY7" fmla="*/ 379239 h 402941"/>
-              </a:gdLst>
-              <a:ahLst/>
-              <a:cxnLst>
-                <a:cxn ang="0">
-                  <a:pos x="connsiteX0" y="connsiteY0"/>
-                </a:cxn>
-                <a:cxn ang="0">
-                  <a:pos x="connsiteX1" y="connsiteY1"/>
-                </a:cxn>
-                <a:cxn ang="0">
-                  <a:pos x="connsiteX2" y="connsiteY2"/>
-                </a:cxn>
-                <a:cxn ang="0">
-                  <a:pos x="connsiteX3" y="connsiteY3"/>
-                </a:cxn>
-                <a:cxn ang="0">
-                  <a:pos x="connsiteX4" y="connsiteY4"/>
-                </a:cxn>
-                <a:cxn ang="0">
-                  <a:pos x="connsiteX5" y="connsiteY5"/>
-                </a:cxn>
-                <a:cxn ang="0">
-                  <a:pos x="connsiteX6" y="connsiteY6"/>
-                </a:cxn>
-                <a:cxn ang="0">
-                  <a:pos x="connsiteX7" y="connsiteY7"/>
-                </a:cxn>
-              </a:cxnLst>
-              <a:rect l="l" t="t" r="r" b="b"/>
-              <a:pathLst>
-                <a:path w="402941" h="402941">
-                  <a:moveTo>
-                    <a:pt x="0" y="402941"/>
-                  </a:moveTo>
-                  <a:lnTo>
-                    <a:pt x="402941" y="402941"/>
-                  </a:lnTo>
-                  <a:lnTo>
-                    <a:pt x="402941" y="0"/>
-                  </a:lnTo>
-                  <a:lnTo>
-                    <a:pt x="0" y="0"/>
-                  </a:lnTo>
-                  <a:close/>
-                  <a:moveTo>
-                    <a:pt x="23702" y="23702"/>
-                  </a:moveTo>
-                  <a:lnTo>
-                    <a:pt x="379239" y="23702"/>
-                  </a:lnTo>
-                  <a:lnTo>
-                    <a:pt x="379239" y="379239"/>
-                  </a:lnTo>
-                  <a:lnTo>
-                    <a:pt x="23702" y="379239"/>
-                  </a:lnTo>
-                  <a:close/>
-                </a:path>
-              </a:pathLst>
-            </a:custGeom>
-            <a:solidFill>
-              <a:schemeClr val="accent6"/>
-            </a:solidFill>
-            <a:ln w="11807" cap="flat">
-              <a:noFill/>
-              <a:prstDash val="solid"/>
-              <a:miter/>
-            </a:ln>
-          </p:spPr>
-          <p:txBody>
-            <a:bodyPr rtlCol="0" anchor="ctr"/>
-            <a:lstStyle/>
-            <a:p>
-              <a:endParaRPr lang="da-DK"/>
-            </a:p>
-          </p:txBody>
-        </p:sp>
-        <p:sp>
-          <p:nvSpPr>
-            <p:cNvPr id="49" name="Kombinationstegning: figur 48">
-              <a:extLst>
-                <a:ext uri="{FF2B5EF4-FFF2-40B4-BE49-F238E27FC236}">
-                  <a16:creationId xmlns:a16="http://schemas.microsoft.com/office/drawing/2014/main" id="{0D78A974-C118-464F-8643-BF0E9C3F4367}"/>
-                </a:ext>
-              </a:extLst>
-            </p:cNvPr>
-            <p:cNvSpPr/>
-            <p:nvPr/>
-          </p:nvSpPr>
-          <p:spPr>
-            <a:xfrm>
-              <a:off x="4585625" y="2485382"/>
-              <a:ext cx="853287" cy="853287"/>
-            </a:xfrm>
-            <a:custGeom>
-              <a:avLst/>
-              <a:gdLst>
-                <a:gd name="connsiteX0" fmla="*/ 853287 w 853287"/>
-                <a:gd name="connsiteY0" fmla="*/ 201471 h 853287"/>
-                <a:gd name="connsiteX1" fmla="*/ 853287 w 853287"/>
-                <a:gd name="connsiteY1" fmla="*/ 177768 h 853287"/>
-                <a:gd name="connsiteX2" fmla="*/ 746626 w 853287"/>
-                <a:gd name="connsiteY2" fmla="*/ 177768 h 853287"/>
-                <a:gd name="connsiteX3" fmla="*/ 746626 w 853287"/>
-                <a:gd name="connsiteY3" fmla="*/ 165917 h 853287"/>
-                <a:gd name="connsiteX4" fmla="*/ 687370 w 853287"/>
-                <a:gd name="connsiteY4" fmla="*/ 106661 h 853287"/>
-                <a:gd name="connsiteX5" fmla="*/ 675519 w 853287"/>
-                <a:gd name="connsiteY5" fmla="*/ 106661 h 853287"/>
-                <a:gd name="connsiteX6" fmla="*/ 675519 w 853287"/>
-                <a:gd name="connsiteY6" fmla="*/ 0 h 853287"/>
-                <a:gd name="connsiteX7" fmla="*/ 651816 w 853287"/>
-                <a:gd name="connsiteY7" fmla="*/ 0 h 853287"/>
-                <a:gd name="connsiteX8" fmla="*/ 651816 w 853287"/>
-                <a:gd name="connsiteY8" fmla="*/ 106661 h 853287"/>
-                <a:gd name="connsiteX9" fmla="*/ 580709 w 853287"/>
-                <a:gd name="connsiteY9" fmla="*/ 106661 h 853287"/>
-                <a:gd name="connsiteX10" fmla="*/ 580709 w 853287"/>
-                <a:gd name="connsiteY10" fmla="*/ 0 h 853287"/>
-                <a:gd name="connsiteX11" fmla="*/ 557007 w 853287"/>
-                <a:gd name="connsiteY11" fmla="*/ 0 h 853287"/>
-                <a:gd name="connsiteX12" fmla="*/ 557007 w 853287"/>
-                <a:gd name="connsiteY12" fmla="*/ 106661 h 853287"/>
-                <a:gd name="connsiteX13" fmla="*/ 485900 w 853287"/>
-                <a:gd name="connsiteY13" fmla="*/ 106661 h 853287"/>
-                <a:gd name="connsiteX14" fmla="*/ 485900 w 853287"/>
-                <a:gd name="connsiteY14" fmla="*/ 0 h 853287"/>
-                <a:gd name="connsiteX15" fmla="*/ 462197 w 853287"/>
-                <a:gd name="connsiteY15" fmla="*/ 0 h 853287"/>
-                <a:gd name="connsiteX16" fmla="*/ 462197 w 853287"/>
-                <a:gd name="connsiteY16" fmla="*/ 106661 h 853287"/>
-                <a:gd name="connsiteX17" fmla="*/ 391090 w 853287"/>
-                <a:gd name="connsiteY17" fmla="*/ 106661 h 853287"/>
-                <a:gd name="connsiteX18" fmla="*/ 391090 w 853287"/>
-                <a:gd name="connsiteY18" fmla="*/ 0 h 853287"/>
-                <a:gd name="connsiteX19" fmla="*/ 367387 w 853287"/>
-                <a:gd name="connsiteY19" fmla="*/ 0 h 853287"/>
-                <a:gd name="connsiteX20" fmla="*/ 367387 w 853287"/>
-                <a:gd name="connsiteY20" fmla="*/ 106661 h 853287"/>
-                <a:gd name="connsiteX21" fmla="*/ 296280 w 853287"/>
-                <a:gd name="connsiteY21" fmla="*/ 106661 h 853287"/>
-                <a:gd name="connsiteX22" fmla="*/ 296280 w 853287"/>
-                <a:gd name="connsiteY22" fmla="*/ 0 h 853287"/>
-                <a:gd name="connsiteX23" fmla="*/ 272578 w 853287"/>
-                <a:gd name="connsiteY23" fmla="*/ 0 h 853287"/>
-                <a:gd name="connsiteX24" fmla="*/ 272578 w 853287"/>
-                <a:gd name="connsiteY24" fmla="*/ 106661 h 853287"/>
-                <a:gd name="connsiteX25" fmla="*/ 201471 w 853287"/>
-                <a:gd name="connsiteY25" fmla="*/ 106661 h 853287"/>
-                <a:gd name="connsiteX26" fmla="*/ 201471 w 853287"/>
-                <a:gd name="connsiteY26" fmla="*/ 0 h 853287"/>
-                <a:gd name="connsiteX27" fmla="*/ 177768 w 853287"/>
-                <a:gd name="connsiteY27" fmla="*/ 0 h 853287"/>
-                <a:gd name="connsiteX28" fmla="*/ 177768 w 853287"/>
-                <a:gd name="connsiteY28" fmla="*/ 106661 h 853287"/>
-                <a:gd name="connsiteX29" fmla="*/ 165917 w 853287"/>
-                <a:gd name="connsiteY29" fmla="*/ 106661 h 853287"/>
-                <a:gd name="connsiteX30" fmla="*/ 106661 w 853287"/>
-                <a:gd name="connsiteY30" fmla="*/ 165917 h 853287"/>
-                <a:gd name="connsiteX31" fmla="*/ 106661 w 853287"/>
-                <a:gd name="connsiteY31" fmla="*/ 177768 h 853287"/>
-                <a:gd name="connsiteX32" fmla="*/ 0 w 853287"/>
-                <a:gd name="connsiteY32" fmla="*/ 177768 h 853287"/>
-                <a:gd name="connsiteX33" fmla="*/ 0 w 853287"/>
-                <a:gd name="connsiteY33" fmla="*/ 201471 h 853287"/>
-                <a:gd name="connsiteX34" fmla="*/ 106661 w 853287"/>
-                <a:gd name="connsiteY34" fmla="*/ 201471 h 853287"/>
-                <a:gd name="connsiteX35" fmla="*/ 106661 w 853287"/>
-                <a:gd name="connsiteY35" fmla="*/ 272578 h 853287"/>
-                <a:gd name="connsiteX36" fmla="*/ 0 w 853287"/>
-                <a:gd name="connsiteY36" fmla="*/ 272578 h 853287"/>
-                <a:gd name="connsiteX37" fmla="*/ 0 w 853287"/>
-                <a:gd name="connsiteY37" fmla="*/ 296280 h 853287"/>
-                <a:gd name="connsiteX38" fmla="*/ 106661 w 853287"/>
-                <a:gd name="connsiteY38" fmla="*/ 296280 h 853287"/>
-                <a:gd name="connsiteX39" fmla="*/ 106661 w 853287"/>
-                <a:gd name="connsiteY39" fmla="*/ 367387 h 853287"/>
-                <a:gd name="connsiteX40" fmla="*/ 0 w 853287"/>
-                <a:gd name="connsiteY40" fmla="*/ 367387 h 853287"/>
-                <a:gd name="connsiteX41" fmla="*/ 0 w 853287"/>
-                <a:gd name="connsiteY41" fmla="*/ 391090 h 853287"/>
-                <a:gd name="connsiteX42" fmla="*/ 106661 w 853287"/>
-                <a:gd name="connsiteY42" fmla="*/ 391090 h 853287"/>
-                <a:gd name="connsiteX43" fmla="*/ 106661 w 853287"/>
-                <a:gd name="connsiteY43" fmla="*/ 462197 h 853287"/>
-                <a:gd name="connsiteX44" fmla="*/ 0 w 853287"/>
-                <a:gd name="connsiteY44" fmla="*/ 462197 h 853287"/>
-                <a:gd name="connsiteX45" fmla="*/ 0 w 853287"/>
-                <a:gd name="connsiteY45" fmla="*/ 485900 h 853287"/>
-                <a:gd name="connsiteX46" fmla="*/ 106661 w 853287"/>
-                <a:gd name="connsiteY46" fmla="*/ 485900 h 853287"/>
-                <a:gd name="connsiteX47" fmla="*/ 106661 w 853287"/>
-                <a:gd name="connsiteY47" fmla="*/ 557007 h 853287"/>
-                <a:gd name="connsiteX48" fmla="*/ 0 w 853287"/>
-                <a:gd name="connsiteY48" fmla="*/ 557007 h 853287"/>
-                <a:gd name="connsiteX49" fmla="*/ 0 w 853287"/>
-                <a:gd name="connsiteY49" fmla="*/ 580709 h 853287"/>
-                <a:gd name="connsiteX50" fmla="*/ 106661 w 853287"/>
-                <a:gd name="connsiteY50" fmla="*/ 580709 h 853287"/>
-                <a:gd name="connsiteX51" fmla="*/ 106661 w 853287"/>
-                <a:gd name="connsiteY51" fmla="*/ 651816 h 853287"/>
-                <a:gd name="connsiteX52" fmla="*/ 0 w 853287"/>
-                <a:gd name="connsiteY52" fmla="*/ 651816 h 853287"/>
-                <a:gd name="connsiteX53" fmla="*/ 0 w 853287"/>
-                <a:gd name="connsiteY53" fmla="*/ 675519 h 853287"/>
-                <a:gd name="connsiteX54" fmla="*/ 106661 w 853287"/>
-                <a:gd name="connsiteY54" fmla="*/ 675519 h 853287"/>
-                <a:gd name="connsiteX55" fmla="*/ 106661 w 853287"/>
-                <a:gd name="connsiteY55" fmla="*/ 687370 h 853287"/>
-                <a:gd name="connsiteX56" fmla="*/ 165917 w 853287"/>
-                <a:gd name="connsiteY56" fmla="*/ 746626 h 853287"/>
-                <a:gd name="connsiteX57" fmla="*/ 177768 w 853287"/>
-                <a:gd name="connsiteY57" fmla="*/ 746626 h 853287"/>
-                <a:gd name="connsiteX58" fmla="*/ 177768 w 853287"/>
-                <a:gd name="connsiteY58" fmla="*/ 853287 h 853287"/>
-                <a:gd name="connsiteX59" fmla="*/ 201471 w 853287"/>
-                <a:gd name="connsiteY59" fmla="*/ 853287 h 853287"/>
-                <a:gd name="connsiteX60" fmla="*/ 201471 w 853287"/>
-                <a:gd name="connsiteY60" fmla="*/ 746626 h 853287"/>
-                <a:gd name="connsiteX61" fmla="*/ 272578 w 853287"/>
-                <a:gd name="connsiteY61" fmla="*/ 746626 h 853287"/>
-                <a:gd name="connsiteX62" fmla="*/ 272578 w 853287"/>
-                <a:gd name="connsiteY62" fmla="*/ 853287 h 853287"/>
-                <a:gd name="connsiteX63" fmla="*/ 296280 w 853287"/>
-                <a:gd name="connsiteY63" fmla="*/ 853287 h 853287"/>
-                <a:gd name="connsiteX64" fmla="*/ 296280 w 853287"/>
-                <a:gd name="connsiteY64" fmla="*/ 746626 h 853287"/>
-                <a:gd name="connsiteX65" fmla="*/ 367387 w 853287"/>
-                <a:gd name="connsiteY65" fmla="*/ 746626 h 853287"/>
-                <a:gd name="connsiteX66" fmla="*/ 367387 w 853287"/>
-                <a:gd name="connsiteY66" fmla="*/ 853287 h 853287"/>
-                <a:gd name="connsiteX67" fmla="*/ 391090 w 853287"/>
-                <a:gd name="connsiteY67" fmla="*/ 853287 h 853287"/>
-                <a:gd name="connsiteX68" fmla="*/ 391090 w 853287"/>
-                <a:gd name="connsiteY68" fmla="*/ 746626 h 853287"/>
-                <a:gd name="connsiteX69" fmla="*/ 462197 w 853287"/>
-                <a:gd name="connsiteY69" fmla="*/ 746626 h 853287"/>
-                <a:gd name="connsiteX70" fmla="*/ 462197 w 853287"/>
-                <a:gd name="connsiteY70" fmla="*/ 853287 h 853287"/>
-                <a:gd name="connsiteX71" fmla="*/ 485900 w 853287"/>
-                <a:gd name="connsiteY71" fmla="*/ 853287 h 853287"/>
-                <a:gd name="connsiteX72" fmla="*/ 485900 w 853287"/>
-                <a:gd name="connsiteY72" fmla="*/ 746626 h 853287"/>
-                <a:gd name="connsiteX73" fmla="*/ 557007 w 853287"/>
-                <a:gd name="connsiteY73" fmla="*/ 746626 h 853287"/>
-                <a:gd name="connsiteX74" fmla="*/ 557007 w 853287"/>
-                <a:gd name="connsiteY74" fmla="*/ 853287 h 853287"/>
-                <a:gd name="connsiteX75" fmla="*/ 580709 w 853287"/>
-                <a:gd name="connsiteY75" fmla="*/ 853287 h 853287"/>
-                <a:gd name="connsiteX76" fmla="*/ 580709 w 853287"/>
-                <a:gd name="connsiteY76" fmla="*/ 746626 h 853287"/>
-                <a:gd name="connsiteX77" fmla="*/ 651816 w 853287"/>
-                <a:gd name="connsiteY77" fmla="*/ 746626 h 853287"/>
-                <a:gd name="connsiteX78" fmla="*/ 651816 w 853287"/>
-                <a:gd name="connsiteY78" fmla="*/ 853287 h 853287"/>
-                <a:gd name="connsiteX79" fmla="*/ 675519 w 853287"/>
-                <a:gd name="connsiteY79" fmla="*/ 853287 h 853287"/>
-                <a:gd name="connsiteX80" fmla="*/ 675519 w 853287"/>
-                <a:gd name="connsiteY80" fmla="*/ 746626 h 853287"/>
-                <a:gd name="connsiteX81" fmla="*/ 687370 w 853287"/>
-                <a:gd name="connsiteY81" fmla="*/ 746626 h 853287"/>
-                <a:gd name="connsiteX82" fmla="*/ 746626 w 853287"/>
-                <a:gd name="connsiteY82" fmla="*/ 687370 h 853287"/>
-                <a:gd name="connsiteX83" fmla="*/ 746626 w 853287"/>
-                <a:gd name="connsiteY83" fmla="*/ 675519 h 853287"/>
-                <a:gd name="connsiteX84" fmla="*/ 853287 w 853287"/>
-                <a:gd name="connsiteY84" fmla="*/ 675519 h 853287"/>
-                <a:gd name="connsiteX85" fmla="*/ 853287 w 853287"/>
-                <a:gd name="connsiteY85" fmla="*/ 651816 h 853287"/>
-                <a:gd name="connsiteX86" fmla="*/ 746626 w 853287"/>
-                <a:gd name="connsiteY86" fmla="*/ 651816 h 853287"/>
-                <a:gd name="connsiteX87" fmla="*/ 746626 w 853287"/>
-                <a:gd name="connsiteY87" fmla="*/ 580709 h 853287"/>
-                <a:gd name="connsiteX88" fmla="*/ 853287 w 853287"/>
-                <a:gd name="connsiteY88" fmla="*/ 580709 h 853287"/>
-                <a:gd name="connsiteX89" fmla="*/ 853287 w 853287"/>
-                <a:gd name="connsiteY89" fmla="*/ 557007 h 853287"/>
-                <a:gd name="connsiteX90" fmla="*/ 746626 w 853287"/>
-                <a:gd name="connsiteY90" fmla="*/ 557007 h 853287"/>
-                <a:gd name="connsiteX91" fmla="*/ 746626 w 853287"/>
-                <a:gd name="connsiteY91" fmla="*/ 485900 h 853287"/>
-                <a:gd name="connsiteX92" fmla="*/ 853287 w 853287"/>
-                <a:gd name="connsiteY92" fmla="*/ 485900 h 853287"/>
-                <a:gd name="connsiteX93" fmla="*/ 853287 w 853287"/>
-                <a:gd name="connsiteY93" fmla="*/ 462197 h 853287"/>
-                <a:gd name="connsiteX94" fmla="*/ 746626 w 853287"/>
-                <a:gd name="connsiteY94" fmla="*/ 462197 h 853287"/>
-                <a:gd name="connsiteX95" fmla="*/ 746626 w 853287"/>
-                <a:gd name="connsiteY95" fmla="*/ 391090 h 853287"/>
-                <a:gd name="connsiteX96" fmla="*/ 853287 w 853287"/>
-                <a:gd name="connsiteY96" fmla="*/ 391090 h 853287"/>
-                <a:gd name="connsiteX97" fmla="*/ 853287 w 853287"/>
-                <a:gd name="connsiteY97" fmla="*/ 367387 h 853287"/>
-                <a:gd name="connsiteX98" fmla="*/ 746626 w 853287"/>
-                <a:gd name="connsiteY98" fmla="*/ 367387 h 853287"/>
-                <a:gd name="connsiteX99" fmla="*/ 746626 w 853287"/>
-                <a:gd name="connsiteY99" fmla="*/ 296280 h 853287"/>
-                <a:gd name="connsiteX100" fmla="*/ 853287 w 853287"/>
-                <a:gd name="connsiteY100" fmla="*/ 296280 h 853287"/>
-                <a:gd name="connsiteX101" fmla="*/ 853287 w 853287"/>
-                <a:gd name="connsiteY101" fmla="*/ 272578 h 853287"/>
-                <a:gd name="connsiteX102" fmla="*/ 746626 w 853287"/>
-                <a:gd name="connsiteY102" fmla="*/ 272578 h 853287"/>
-                <a:gd name="connsiteX103" fmla="*/ 746626 w 853287"/>
-                <a:gd name="connsiteY103" fmla="*/ 201471 h 853287"/>
-                <a:gd name="connsiteX104" fmla="*/ 722924 w 853287"/>
-                <a:gd name="connsiteY104" fmla="*/ 687370 h 853287"/>
-                <a:gd name="connsiteX105" fmla="*/ 687370 w 853287"/>
-                <a:gd name="connsiteY105" fmla="*/ 722924 h 853287"/>
-                <a:gd name="connsiteX106" fmla="*/ 165917 w 853287"/>
-                <a:gd name="connsiteY106" fmla="*/ 722924 h 853287"/>
-                <a:gd name="connsiteX107" fmla="*/ 130363 w 853287"/>
-                <a:gd name="connsiteY107" fmla="*/ 687370 h 853287"/>
-                <a:gd name="connsiteX108" fmla="*/ 130363 w 853287"/>
-                <a:gd name="connsiteY108" fmla="*/ 165917 h 853287"/>
-                <a:gd name="connsiteX109" fmla="*/ 165917 w 853287"/>
-                <a:gd name="connsiteY109" fmla="*/ 130363 h 853287"/>
-                <a:gd name="connsiteX110" fmla="*/ 687370 w 853287"/>
-                <a:gd name="connsiteY110" fmla="*/ 130363 h 853287"/>
-                <a:gd name="connsiteX111" fmla="*/ 722924 w 853287"/>
-                <a:gd name="connsiteY111" fmla="*/ 165917 h 853287"/>
-              </a:gdLst>
-              <a:ahLst/>
-              <a:cxnLst>
-                <a:cxn ang="0">
-                  <a:pos x="connsiteX0" y="connsiteY0"/>
-                </a:cxn>
-                <a:cxn ang="0">
-                  <a:pos x="connsiteX1" y="connsiteY1"/>
-                </a:cxn>
-                <a:cxn ang="0">
-                  <a:pos x="connsiteX2" y="connsiteY2"/>
-                </a:cxn>
-                <a:cxn ang="0">
-                  <a:pos x="connsiteX3" y="connsiteY3"/>
-                </a:cxn>
-                <a:cxn ang="0">
-                  <a:pos x="connsiteX4" y="connsiteY4"/>
-                </a:cxn>
-                <a:cxn ang="0">
-                  <a:pos x="connsiteX5" y="connsiteY5"/>
-                </a:cxn>
-                <a:cxn ang="0">
-                  <a:pos x="connsiteX6" y="connsiteY6"/>
-                </a:cxn>
-                <a:cxn ang="0">
-                  <a:pos x="connsiteX7" y="connsiteY7"/>
-                </a:cxn>
-                <a:cxn ang="0">
-                  <a:pos x="connsiteX8" y="connsiteY8"/>
-                </a:cxn>
-                <a:cxn ang="0">
-                  <a:pos x="connsiteX9" y="connsiteY9"/>
-                </a:cxn>
-                <a:cxn ang="0">
-                  <a:pos x="connsiteX10" y="connsiteY10"/>
-                </a:cxn>
-                <a:cxn ang="0">
-                  <a:pos x="connsiteX11" y="connsiteY11"/>
-                </a:cxn>
-                <a:cxn ang="0">
-                  <a:pos x="connsiteX12" y="connsiteY12"/>
-                </a:cxn>
-                <a:cxn ang="0">
-                  <a:pos x="connsiteX13" y="connsiteY13"/>
-                </a:cxn>
-                <a:cxn ang="0">
-                  <a:pos x="connsiteX14" y="connsiteY14"/>
-                </a:cxn>
-                <a:cxn ang="0">
-                  <a:pos x="connsiteX15" y="connsiteY15"/>
-                </a:cxn>
-                <a:cxn ang="0">
-                  <a:pos x="connsiteX16" y="connsiteY16"/>
-                </a:cxn>
-                <a:cxn ang="0">
-                  <a:pos x="connsiteX17" y="connsiteY17"/>
-                </a:cxn>
-                <a:cxn ang="0">
-                  <a:pos x="connsiteX18" y="connsiteY18"/>
-                </a:cxn>
-                <a:cxn ang="0">
-                  <a:pos x="connsiteX19" y="connsiteY19"/>
-                </a:cxn>
-                <a:cxn ang="0">
-                  <a:pos x="connsiteX20" y="connsiteY20"/>
-                </a:cxn>
-                <a:cxn ang="0">
-                  <a:pos x="connsiteX21" y="connsiteY21"/>
-                </a:cxn>
-                <a:cxn ang="0">
-                  <a:pos x="connsiteX22" y="connsiteY22"/>
-                </a:cxn>
-                <a:cxn ang="0">
-                  <a:pos x="connsiteX23" y="connsiteY23"/>
-                </a:cxn>
-                <a:cxn ang="0">
-                  <a:pos x="connsiteX24" y="connsiteY24"/>
-                </a:cxn>
-                <a:cxn ang="0">
-                  <a:pos x="connsiteX25" y="connsiteY25"/>
-                </a:cxn>
-                <a:cxn ang="0">
-                  <a:pos x="connsiteX26" y="connsiteY26"/>
-                </a:cxn>
-                <a:cxn ang="0">
-                  <a:pos x="connsiteX27" y="connsiteY27"/>
-                </a:cxn>
-                <a:cxn ang="0">
-                  <a:pos x="connsiteX28" y="connsiteY28"/>
-                </a:cxn>
-                <a:cxn ang="0">
-                  <a:pos x="connsiteX29" y="connsiteY29"/>
-                </a:cxn>
-                <a:cxn ang="0">
-                  <a:pos x="connsiteX30" y="connsiteY30"/>
-                </a:cxn>
-                <a:cxn ang="0">
-                  <a:pos x="connsiteX31" y="connsiteY31"/>
-                </a:cxn>
-                <a:cxn ang="0">
-                  <a:pos x="connsiteX32" y="connsiteY32"/>
-                </a:cxn>
-                <a:cxn ang="0">
-                  <a:pos x="connsiteX33" y="connsiteY33"/>
-                </a:cxn>
-                <a:cxn ang="0">
-                  <a:pos x="connsiteX34" y="connsiteY34"/>
-                </a:cxn>
-                <a:cxn ang="0">
-                  <a:pos x="connsiteX35" y="connsiteY35"/>
-                </a:cxn>
-                <a:cxn ang="0">
-                  <a:pos x="connsiteX36" y="connsiteY36"/>
-                </a:cxn>
-                <a:cxn ang="0">
-                  <a:pos x="connsiteX37" y="connsiteY37"/>
-                </a:cxn>
-                <a:cxn ang="0">
-                  <a:pos x="connsiteX38" y="connsiteY38"/>
-                </a:cxn>
-                <a:cxn ang="0">
-                  <a:pos x="connsiteX39" y="connsiteY39"/>
-                </a:cxn>
-                <a:cxn ang="0">
-                  <a:pos x="connsiteX40" y="connsiteY40"/>
-                </a:cxn>
-                <a:cxn ang="0">
-                  <a:pos x="connsiteX41" y="connsiteY41"/>
-                </a:cxn>
-                <a:cxn ang="0">
-                  <a:pos x="connsiteX42" y="connsiteY42"/>
-                </a:cxn>
-                <a:cxn ang="0">
-                  <a:pos x="connsiteX43" y="connsiteY43"/>
-                </a:cxn>
-                <a:cxn ang="0">
-                  <a:pos x="connsiteX44" y="connsiteY44"/>
-                </a:cxn>
-                <a:cxn ang="0">
-                  <a:pos x="connsiteX45" y="connsiteY45"/>
-                </a:cxn>
-                <a:cxn ang="0">
-                  <a:pos x="connsiteX46" y="connsiteY46"/>
-                </a:cxn>
-                <a:cxn ang="0">
-                  <a:pos x="connsiteX47" y="connsiteY47"/>
-                </a:cxn>
-                <a:cxn ang="0">
-                  <a:pos x="connsiteX48" y="connsiteY48"/>
-                </a:cxn>
-                <a:cxn ang="0">
-                  <a:pos x="connsiteX49" y="connsiteY49"/>
-                </a:cxn>
-                <a:cxn ang="0">
-                  <a:pos x="connsiteX50" y="connsiteY50"/>
-                </a:cxn>
-                <a:cxn ang="0">
-                  <a:pos x="connsiteX51" y="connsiteY51"/>
-                </a:cxn>
-                <a:cxn ang="0">
-                  <a:pos x="connsiteX52" y="connsiteY52"/>
-                </a:cxn>
-                <a:cxn ang="0">
-                  <a:pos x="connsiteX53" y="connsiteY53"/>
-                </a:cxn>
-                <a:cxn ang="0">
-                  <a:pos x="connsiteX54" y="connsiteY54"/>
-                </a:cxn>
-                <a:cxn ang="0">
-                  <a:pos x="connsiteX55" y="connsiteY55"/>
-                </a:cxn>
-                <a:cxn ang="0">
-                  <a:pos x="connsiteX56" y="connsiteY56"/>
-                </a:cxn>
-                <a:cxn ang="0">
-                  <a:pos x="connsiteX57" y="connsiteY57"/>
-                </a:cxn>
-                <a:cxn ang="0">
-                  <a:pos x="connsiteX58" y="connsiteY58"/>
-                </a:cxn>
-                <a:cxn ang="0">
-                  <a:pos x="connsiteX59" y="connsiteY59"/>
-                </a:cxn>
-                <a:cxn ang="0">
-                  <a:pos x="connsiteX60" y="connsiteY60"/>
-                </a:cxn>
-                <a:cxn ang="0">
-                  <a:pos x="connsiteX61" y="connsiteY61"/>
-                </a:cxn>
-                <a:cxn ang="0">
-                  <a:pos x="connsiteX62" y="connsiteY62"/>
-                </a:cxn>
-                <a:cxn ang="0">
-                  <a:pos x="connsiteX63" y="connsiteY63"/>
-                </a:cxn>
-                <a:cxn ang="0">
-                  <a:pos x="connsiteX64" y="connsiteY64"/>
-                </a:cxn>
-                <a:cxn ang="0">
-                  <a:pos x="connsiteX65" y="connsiteY65"/>
-                </a:cxn>
-                <a:cxn ang="0">
-                  <a:pos x="connsiteX66" y="connsiteY66"/>
-                </a:cxn>
-                <a:cxn ang="0">
-                  <a:pos x="connsiteX67" y="connsiteY67"/>
-                </a:cxn>
-                <a:cxn ang="0">
-                  <a:pos x="connsiteX68" y="connsiteY68"/>
-                </a:cxn>
-                <a:cxn ang="0">
-                  <a:pos x="connsiteX69" y="connsiteY69"/>
-                </a:cxn>
-                <a:cxn ang="0">
-                  <a:pos x="connsiteX70" y="connsiteY70"/>
-                </a:cxn>
-                <a:cxn ang="0">
-                  <a:pos x="connsiteX71" y="connsiteY71"/>
-                </a:cxn>
-                <a:cxn ang="0">
-                  <a:pos x="connsiteX72" y="connsiteY72"/>
-                </a:cxn>
-                <a:cxn ang="0">
-                  <a:pos x="connsiteX73" y="connsiteY73"/>
-                </a:cxn>
-                <a:cxn ang="0">
-                  <a:pos x="connsiteX74" y="connsiteY74"/>
-                </a:cxn>
-                <a:cxn ang="0">
-                  <a:pos x="connsiteX75" y="connsiteY75"/>
-                </a:cxn>
-                <a:cxn ang="0">
-                  <a:pos x="connsiteX76" y="connsiteY76"/>
-                </a:cxn>
-                <a:cxn ang="0">
-                  <a:pos x="connsiteX77" y="connsiteY77"/>
-                </a:cxn>
-                <a:cxn ang="0">
-                  <a:pos x="connsiteX78" y="connsiteY78"/>
-                </a:cxn>
-                <a:cxn ang="0">
-                  <a:pos x="connsiteX79" y="connsiteY79"/>
-                </a:cxn>
-                <a:cxn ang="0">
-                  <a:pos x="connsiteX80" y="connsiteY80"/>
-                </a:cxn>
-                <a:cxn ang="0">
-                  <a:pos x="connsiteX81" y="connsiteY81"/>
-                </a:cxn>
-                <a:cxn ang="0">
-                  <a:pos x="connsiteX82" y="connsiteY82"/>
-                </a:cxn>
-                <a:cxn ang="0">
-                  <a:pos x="connsiteX83" y="connsiteY83"/>
-                </a:cxn>
-                <a:cxn ang="0">
-                  <a:pos x="connsiteX84" y="connsiteY84"/>
-                </a:cxn>
-                <a:cxn ang="0">
-                  <a:pos x="connsiteX85" y="connsiteY85"/>
-                </a:cxn>
-                <a:cxn ang="0">
-                  <a:pos x="connsiteX86" y="connsiteY86"/>
-                </a:cxn>
-                <a:cxn ang="0">
-                  <a:pos x="connsiteX87" y="connsiteY87"/>
-                </a:cxn>
-                <a:cxn ang="0">
-                  <a:pos x="connsiteX88" y="connsiteY88"/>
-                </a:cxn>
-                <a:cxn ang="0">
-                  <a:pos x="connsiteX89" y="connsiteY89"/>
-                </a:cxn>
-                <a:cxn ang="0">
-                  <a:pos x="connsiteX90" y="connsiteY90"/>
-                </a:cxn>
-                <a:cxn ang="0">
-                  <a:pos x="connsiteX91" y="connsiteY91"/>
-                </a:cxn>
-                <a:cxn ang="0">
-                  <a:pos x="connsiteX92" y="connsiteY92"/>
-                </a:cxn>
-                <a:cxn ang="0">
-                  <a:pos x="connsiteX93" y="connsiteY93"/>
-                </a:cxn>
-                <a:cxn ang="0">
-                  <a:pos x="connsiteX94" y="connsiteY94"/>
-                </a:cxn>
-                <a:cxn ang="0">
-                  <a:pos x="connsiteX95" y="connsiteY95"/>
-                </a:cxn>
-                <a:cxn ang="0">
-                  <a:pos x="connsiteX96" y="connsiteY96"/>
-                </a:cxn>
-                <a:cxn ang="0">
-                  <a:pos x="connsiteX97" y="connsiteY97"/>
-                </a:cxn>
-                <a:cxn ang="0">
-                  <a:pos x="connsiteX98" y="connsiteY98"/>
-                </a:cxn>
-                <a:cxn ang="0">
-                  <a:pos x="connsiteX99" y="connsiteY99"/>
-                </a:cxn>
-                <a:cxn ang="0">
-                  <a:pos x="connsiteX100" y="connsiteY100"/>
-                </a:cxn>
-                <a:cxn ang="0">
-                  <a:pos x="connsiteX101" y="connsiteY101"/>
-                </a:cxn>
-                <a:cxn ang="0">
-                  <a:pos x="connsiteX102" y="connsiteY102"/>
-                </a:cxn>
-                <a:cxn ang="0">
-                  <a:pos x="connsiteX103" y="connsiteY103"/>
-                </a:cxn>
-                <a:cxn ang="0">
-                  <a:pos x="connsiteX104" y="connsiteY104"/>
-                </a:cxn>
-                <a:cxn ang="0">
-                  <a:pos x="connsiteX105" y="connsiteY105"/>
-                </a:cxn>
-                <a:cxn ang="0">
-                  <a:pos x="connsiteX106" y="connsiteY106"/>
-                </a:cxn>
-                <a:cxn ang="0">
-                  <a:pos x="connsiteX107" y="connsiteY107"/>
-                </a:cxn>
-                <a:cxn ang="0">
-                  <a:pos x="connsiteX108" y="connsiteY108"/>
-                </a:cxn>
-                <a:cxn ang="0">
-                  <a:pos x="connsiteX109" y="connsiteY109"/>
-                </a:cxn>
-                <a:cxn ang="0">
-                  <a:pos x="connsiteX110" y="connsiteY110"/>
-                </a:cxn>
-                <a:cxn ang="0">
-                  <a:pos x="connsiteX111" y="connsiteY111"/>
-                </a:cxn>
-              </a:cxnLst>
-              <a:rect l="l" t="t" r="r" b="b"/>
-              <a:pathLst>
-                <a:path w="853287" h="853287">
-                  <a:moveTo>
-                    <a:pt x="853287" y="201471"/>
-                  </a:moveTo>
-                  <a:lnTo>
-                    <a:pt x="853287" y="177768"/>
-                  </a:lnTo>
-                  <a:lnTo>
-                    <a:pt x="746626" y="177768"/>
-                  </a:lnTo>
-                  <a:lnTo>
-                    <a:pt x="746626" y="165917"/>
-                  </a:lnTo>
-                  <a:cubicBezTo>
-                    <a:pt x="746587" y="133206"/>
-                    <a:pt x="720081" y="106700"/>
-                    <a:pt x="687370" y="106661"/>
-                  </a:cubicBezTo>
-                  <a:lnTo>
-                    <a:pt x="675519" y="106661"/>
-                  </a:lnTo>
-                  <a:lnTo>
-                    <a:pt x="675519" y="0"/>
-                  </a:lnTo>
-                  <a:lnTo>
-                    <a:pt x="651816" y="0"/>
-                  </a:lnTo>
-                  <a:lnTo>
-                    <a:pt x="651816" y="106661"/>
-                  </a:lnTo>
-                  <a:lnTo>
-                    <a:pt x="580709" y="106661"/>
-                  </a:lnTo>
-                  <a:lnTo>
-                    <a:pt x="580709" y="0"/>
-                  </a:lnTo>
-                  <a:lnTo>
-                    <a:pt x="557007" y="0"/>
-                  </a:lnTo>
-                  <a:lnTo>
-                    <a:pt x="557007" y="106661"/>
-                  </a:lnTo>
-                  <a:lnTo>
-                    <a:pt x="485900" y="106661"/>
-                  </a:lnTo>
-                  <a:lnTo>
-                    <a:pt x="485900" y="0"/>
-                  </a:lnTo>
-                  <a:lnTo>
-                    <a:pt x="462197" y="0"/>
-                  </a:lnTo>
-                  <a:lnTo>
-                    <a:pt x="462197" y="106661"/>
-                  </a:lnTo>
-                  <a:lnTo>
-                    <a:pt x="391090" y="106661"/>
-                  </a:lnTo>
-                  <a:lnTo>
-                    <a:pt x="391090" y="0"/>
-                  </a:lnTo>
-                  <a:lnTo>
-                    <a:pt x="367387" y="0"/>
-                  </a:lnTo>
-                  <a:lnTo>
-                    <a:pt x="367387" y="106661"/>
-                  </a:lnTo>
-                  <a:lnTo>
-                    <a:pt x="296280" y="106661"/>
-                  </a:lnTo>
-                  <a:lnTo>
-                    <a:pt x="296280" y="0"/>
-                  </a:lnTo>
-                  <a:lnTo>
-                    <a:pt x="272578" y="0"/>
-                  </a:lnTo>
-                  <a:lnTo>
-                    <a:pt x="272578" y="106661"/>
-                  </a:lnTo>
-                  <a:lnTo>
-                    <a:pt x="201471" y="106661"/>
-                  </a:lnTo>
-                  <a:lnTo>
-                    <a:pt x="201471" y="0"/>
-                  </a:lnTo>
-                  <a:lnTo>
-                    <a:pt x="177768" y="0"/>
-                  </a:lnTo>
-                  <a:lnTo>
-                    <a:pt x="177768" y="106661"/>
-                  </a:lnTo>
-                  <a:lnTo>
-                    <a:pt x="165917" y="106661"/>
-                  </a:lnTo>
-                  <a:cubicBezTo>
-                    <a:pt x="133206" y="106700"/>
-                    <a:pt x="106700" y="133206"/>
-                    <a:pt x="106661" y="165917"/>
-                  </a:cubicBezTo>
-                  <a:lnTo>
-                    <a:pt x="106661" y="177768"/>
-                  </a:lnTo>
-                  <a:lnTo>
-                    <a:pt x="0" y="177768"/>
-                  </a:lnTo>
-                  <a:lnTo>
-                    <a:pt x="0" y="201471"/>
-                  </a:lnTo>
-                  <a:lnTo>
-                    <a:pt x="106661" y="201471"/>
-                  </a:lnTo>
-                  <a:lnTo>
-                    <a:pt x="106661" y="272578"/>
-                  </a:lnTo>
-                  <a:lnTo>
-                    <a:pt x="0" y="272578"/>
-                  </a:lnTo>
-                  <a:lnTo>
-                    <a:pt x="0" y="296280"/>
-                  </a:lnTo>
-                  <a:lnTo>
-                    <a:pt x="106661" y="296280"/>
-                  </a:lnTo>
-                  <a:lnTo>
-                    <a:pt x="106661" y="367387"/>
-                  </a:lnTo>
-                  <a:lnTo>
-                    <a:pt x="0" y="367387"/>
-                  </a:lnTo>
-                  <a:lnTo>
-                    <a:pt x="0" y="391090"/>
-                  </a:lnTo>
-                  <a:lnTo>
-                    <a:pt x="106661" y="391090"/>
-                  </a:lnTo>
-                  <a:lnTo>
-                    <a:pt x="106661" y="462197"/>
-                  </a:lnTo>
-                  <a:lnTo>
-                    <a:pt x="0" y="462197"/>
-                  </a:lnTo>
-                  <a:lnTo>
-                    <a:pt x="0" y="485900"/>
-                  </a:lnTo>
-                  <a:lnTo>
-                    <a:pt x="106661" y="485900"/>
-                  </a:lnTo>
-                  <a:lnTo>
-                    <a:pt x="106661" y="557007"/>
-                  </a:lnTo>
-                  <a:lnTo>
-                    <a:pt x="0" y="557007"/>
-                  </a:lnTo>
-                  <a:lnTo>
-                    <a:pt x="0" y="580709"/>
-                  </a:lnTo>
-                  <a:lnTo>
-                    <a:pt x="106661" y="580709"/>
-                  </a:lnTo>
-                  <a:lnTo>
-                    <a:pt x="106661" y="651816"/>
-                  </a:lnTo>
-                  <a:lnTo>
-                    <a:pt x="0" y="651816"/>
-                  </a:lnTo>
-                  <a:lnTo>
-                    <a:pt x="0" y="675519"/>
-                  </a:lnTo>
-                  <a:lnTo>
-                    <a:pt x="106661" y="675519"/>
-                  </a:lnTo>
-                  <a:lnTo>
-                    <a:pt x="106661" y="687370"/>
-                  </a:lnTo>
-                  <a:cubicBezTo>
-                    <a:pt x="106700" y="720081"/>
-                    <a:pt x="133206" y="746587"/>
-                    <a:pt x="165917" y="746626"/>
-                  </a:cubicBezTo>
-                  <a:lnTo>
-                    <a:pt x="177768" y="746626"/>
-                  </a:lnTo>
-                  <a:lnTo>
-                    <a:pt x="177768" y="853287"/>
-                  </a:lnTo>
-                  <a:lnTo>
-                    <a:pt x="201471" y="853287"/>
-                  </a:lnTo>
-                  <a:lnTo>
-                    <a:pt x="201471" y="746626"/>
-                  </a:lnTo>
-                  <a:lnTo>
-                    <a:pt x="272578" y="746626"/>
-                  </a:lnTo>
-                  <a:lnTo>
-                    <a:pt x="272578" y="853287"/>
-                  </a:lnTo>
-                  <a:lnTo>
-                    <a:pt x="296280" y="853287"/>
-                  </a:lnTo>
-                  <a:lnTo>
-                    <a:pt x="296280" y="746626"/>
-                  </a:lnTo>
-                  <a:lnTo>
-                    <a:pt x="367387" y="746626"/>
-                  </a:lnTo>
-                  <a:lnTo>
-                    <a:pt x="367387" y="853287"/>
-                  </a:lnTo>
-                  <a:lnTo>
-                    <a:pt x="391090" y="853287"/>
-                  </a:lnTo>
-                  <a:lnTo>
-                    <a:pt x="391090" y="746626"/>
-                  </a:lnTo>
-                  <a:lnTo>
-                    <a:pt x="462197" y="746626"/>
-                  </a:lnTo>
-                  <a:lnTo>
-                    <a:pt x="462197" y="853287"/>
-                  </a:lnTo>
-                  <a:lnTo>
-                    <a:pt x="485900" y="853287"/>
-                  </a:lnTo>
-                  <a:lnTo>
-                    <a:pt x="485900" y="746626"/>
-                  </a:lnTo>
-                  <a:lnTo>
-                    <a:pt x="557007" y="746626"/>
-                  </a:lnTo>
-                  <a:lnTo>
-                    <a:pt x="557007" y="853287"/>
-                  </a:lnTo>
-                  <a:lnTo>
-                    <a:pt x="580709" y="853287"/>
-                  </a:lnTo>
-                  <a:lnTo>
-                    <a:pt x="580709" y="746626"/>
-                  </a:lnTo>
-                  <a:lnTo>
-                    <a:pt x="651816" y="746626"/>
-                  </a:lnTo>
-                  <a:lnTo>
-                    <a:pt x="651816" y="853287"/>
-                  </a:lnTo>
-                  <a:lnTo>
-                    <a:pt x="675519" y="853287"/>
-                  </a:lnTo>
-                  <a:lnTo>
-                    <a:pt x="675519" y="746626"/>
-                  </a:lnTo>
-                  <a:lnTo>
-                    <a:pt x="687370" y="746626"/>
-                  </a:lnTo>
-                  <a:cubicBezTo>
-                    <a:pt x="720081" y="746587"/>
-                    <a:pt x="746587" y="720081"/>
-                    <a:pt x="746626" y="687370"/>
-                  </a:cubicBezTo>
-                  <a:lnTo>
-                    <a:pt x="746626" y="675519"/>
-                  </a:lnTo>
-                  <a:lnTo>
-                    <a:pt x="853287" y="675519"/>
-                  </a:lnTo>
-                  <a:lnTo>
-                    <a:pt x="853287" y="651816"/>
-                  </a:lnTo>
-                  <a:lnTo>
-                    <a:pt x="746626" y="651816"/>
-                  </a:lnTo>
-                  <a:lnTo>
-                    <a:pt x="746626" y="580709"/>
-                  </a:lnTo>
-                  <a:lnTo>
-                    <a:pt x="853287" y="580709"/>
-                  </a:lnTo>
-                  <a:lnTo>
-                    <a:pt x="853287" y="557007"/>
-                  </a:lnTo>
-                  <a:lnTo>
-                    <a:pt x="746626" y="557007"/>
-                  </a:lnTo>
-                  <a:lnTo>
-                    <a:pt x="746626" y="485900"/>
-                  </a:lnTo>
-                  <a:lnTo>
-                    <a:pt x="853287" y="485900"/>
-                  </a:lnTo>
-                  <a:lnTo>
-                    <a:pt x="853287" y="462197"/>
-                  </a:lnTo>
-                  <a:lnTo>
-                    <a:pt x="746626" y="462197"/>
-                  </a:lnTo>
-                  <a:lnTo>
-                    <a:pt x="746626" y="391090"/>
-                  </a:lnTo>
-                  <a:lnTo>
-                    <a:pt x="853287" y="391090"/>
-                  </a:lnTo>
-                  <a:lnTo>
-                    <a:pt x="853287" y="367387"/>
-                  </a:lnTo>
-                  <a:lnTo>
-                    <a:pt x="746626" y="367387"/>
-                  </a:lnTo>
-                  <a:lnTo>
-                    <a:pt x="746626" y="296280"/>
-                  </a:lnTo>
-                  <a:lnTo>
-                    <a:pt x="853287" y="296280"/>
-                  </a:lnTo>
-                  <a:lnTo>
-                    <a:pt x="853287" y="272578"/>
-                  </a:lnTo>
-                  <a:lnTo>
-                    <a:pt x="746626" y="272578"/>
-                  </a:lnTo>
-                  <a:lnTo>
-                    <a:pt x="746626" y="201471"/>
-                  </a:lnTo>
-                  <a:close/>
-                  <a:moveTo>
-                    <a:pt x="722924" y="687370"/>
-                  </a:moveTo>
-                  <a:cubicBezTo>
-                    <a:pt x="722924" y="707006"/>
-                    <a:pt x="707006" y="722924"/>
-                    <a:pt x="687370" y="722924"/>
-                  </a:cubicBezTo>
-                  <a:lnTo>
-                    <a:pt x="165917" y="722924"/>
-                  </a:lnTo>
-                  <a:cubicBezTo>
-                    <a:pt x="146281" y="722924"/>
-                    <a:pt x="130363" y="707006"/>
-                    <a:pt x="130363" y="687370"/>
-                  </a:cubicBezTo>
-                  <a:lnTo>
-                    <a:pt x="130363" y="165917"/>
-                  </a:lnTo>
-                  <a:cubicBezTo>
-                    <a:pt x="130363" y="146281"/>
-                    <a:pt x="146281" y="130363"/>
-                    <a:pt x="165917" y="130363"/>
-                  </a:cubicBezTo>
-                  <a:lnTo>
-                    <a:pt x="687370" y="130363"/>
-                  </a:lnTo>
-                  <a:cubicBezTo>
-                    <a:pt x="707006" y="130363"/>
-                    <a:pt x="722924" y="146281"/>
-                    <a:pt x="722924" y="165917"/>
-                  </a:cubicBezTo>
-                  <a:close/>
-                </a:path>
-              </a:pathLst>
-            </a:custGeom>
-            <a:solidFill>
-              <a:schemeClr val="accent6"/>
-            </a:solidFill>
-            <a:ln w="11807" cap="flat">
-              <a:noFill/>
-              <a:prstDash val="solid"/>
-              <a:miter/>
-            </a:ln>
-          </p:spPr>
-          <p:txBody>
-            <a:bodyPr rtlCol="0" anchor="ctr"/>
-            <a:lstStyle/>
-            <a:p>
-              <a:endParaRPr lang="da-DK"/>
-            </a:p>
-          </p:txBody>
-        </p:sp>
-      </p:grpSp>
       <p:cxnSp>
         <p:nvCxnSpPr>
           <p:cNvPr id="13" name="Lige forbindelse 12">
@@ -6608,16 +5510,21 @@
               </a:ext>
             </a:extLst>
           </p:cNvPr>
-          <p:cNvCxnSpPr/>
+          <p:cNvCxnSpPr>
+            <a:cxnSpLocks/>
+            <a:stCxn id="4" idx="3"/>
+          </p:cNvCxnSpPr>
           <p:nvPr/>
         </p:nvCxnSpPr>
         <p:spPr>
           <a:xfrm flipV="1">
-            <a:off x="6774861" y="1879728"/>
-            <a:ext cx="404872" cy="2745107"/>
+            <a:off x="5530237" y="1850907"/>
+            <a:ext cx="1646314" cy="1097119"/>
           </a:xfrm>
-          <a:prstGeom prst="bentConnector2">
-            <a:avLst/>
+          <a:prstGeom prst="bentConnector3">
+            <a:avLst>
+              <a:gd name="adj1" fmla="val 100113"/>
+            </a:avLst>
           </a:prstGeom>
         </p:spPr>
         <p:style>
@@ -6644,13 +5551,16 @@
               </a:ext>
             </a:extLst>
           </p:cNvPr>
-          <p:cNvCxnSpPr/>
+          <p:cNvCxnSpPr>
+            <a:cxnSpLocks/>
+            <a:stCxn id="4" idx="0"/>
+          </p:cNvCxnSpPr>
           <p:nvPr/>
         </p:nvCxnSpPr>
         <p:spPr>
-          <a:xfrm flipV="1">
-            <a:off x="5012269" y="1879728"/>
-            <a:ext cx="0" cy="463440"/>
+          <a:xfrm flipH="1" flipV="1">
+            <a:off x="5012268" y="1803327"/>
+            <a:ext cx="3183" cy="629912"/>
           </a:xfrm>
           <a:prstGeom prst="line">
             <a:avLst/>
@@ -6838,7 +5748,7 @@
         <p:spPr>
           <a:xfrm>
             <a:off x="5662548" y="5303696"/>
-            <a:ext cx="866904" cy="307777"/>
+            <a:ext cx="1113766" cy="307777"/>
           </a:xfrm>
           <a:prstGeom prst="rect">
             <a:avLst/>
@@ -6852,9 +5762,10 @@
           <a:lstStyle/>
           <a:p>
             <a:r>
-              <a:rPr lang="da-DK" sz="1400" dirty="0"/>
-              <a:t>Database</a:t>
-            </a:r>
+              <a:rPr lang="da-DK" sz="1400"/>
+              <a:t>CC-Database</a:t>
+            </a:r>
+            <a:endParaRPr lang="da-DK" sz="1400" dirty="0"/>
           </a:p>
         </p:txBody>
       </p:sp>
@@ -6872,8 +5783,8 @@
         </p:nvSpPr>
         <p:spPr>
           <a:xfrm>
-            <a:off x="3324113" y="2800024"/>
-            <a:ext cx="1100879" cy="307777"/>
+            <a:off x="3779412" y="2758136"/>
+            <a:ext cx="769570" cy="307777"/>
           </a:xfrm>
           <a:prstGeom prst="rect">
             <a:avLst/>
@@ -6887,9 +5798,10 @@
           <a:lstStyle/>
           <a:p>
             <a:r>
-              <a:rPr lang="da-DK" sz="1400" dirty="0"/>
-              <a:t>Raspberry Pi</a:t>
-            </a:r>
+              <a:rPr lang="da-DK" sz="1400"/>
+              <a:t>CC-Web</a:t>
+            </a:r>
+            <a:endParaRPr lang="da-DK" sz="1400" dirty="0"/>
           </a:p>
         </p:txBody>
       </p:sp>
@@ -6907,8 +5819,8 @@
         </p:nvSpPr>
         <p:spPr>
           <a:xfrm>
-            <a:off x="4424992" y="480401"/>
-            <a:ext cx="1101584" cy="492443"/>
+            <a:off x="4609339" y="618036"/>
+            <a:ext cx="785408" cy="307777"/>
           </a:xfrm>
           <a:prstGeom prst="rect">
             <a:avLst/>
@@ -6922,15 +5834,8 @@
           <a:lstStyle/>
           <a:p>
             <a:r>
-              <a:rPr lang="da-DK" sz="1400" dirty="0"/>
-              <a:t>Hjemmeside</a:t>
-            </a:r>
-          </a:p>
-          <a:p>
-            <a:pPr algn="ctr"/>
-            <a:r>
-              <a:rPr lang="da-DK" sz="1200" dirty="0" err="1"/>
-              <a:t>UserApp</a:t>
+              <a:rPr lang="da-DK" sz="1400"/>
+              <a:t>Browser</a:t>
             </a:r>
             <a:endParaRPr lang="da-DK" sz="1200" dirty="0"/>
           </a:p>
@@ -6950,8 +5855,8 @@
         </p:nvSpPr>
         <p:spPr>
           <a:xfrm>
-            <a:off x="6817293" y="476683"/>
-            <a:ext cx="724878" cy="492443"/>
+            <a:off x="6817293" y="630820"/>
+            <a:ext cx="724878" cy="307777"/>
           </a:xfrm>
           <a:prstGeom prst="rect">
             <a:avLst/>
@@ -6966,20 +5871,52 @@
           <a:p>
             <a:pPr algn="ctr"/>
             <a:r>
-              <a:rPr lang="da-DK" sz="1400" dirty="0"/>
-              <a:t>WPF</a:t>
-            </a:r>
-          </a:p>
-          <a:p>
-            <a:pPr algn="ctr"/>
-            <a:r>
-              <a:rPr lang="da-DK" sz="1200" dirty="0" err="1"/>
-              <a:t>UserApp</a:t>
-            </a:r>
-            <a:endParaRPr lang="da-DK" sz="1200" dirty="0"/>
-          </a:p>
-        </p:txBody>
-      </p:sp>
+              <a:rPr lang="en-US" sz="1400"/>
+              <a:t>CC-App</a:t>
+            </a:r>
+            <a:endParaRPr lang="da-DK" sz="1400" dirty="0"/>
+          </a:p>
+        </p:txBody>
+      </p:sp>
+      <p:pic>
+        <p:nvPicPr>
+          <p:cNvPr id="4" name="Grafik 3" descr="Webdesign kontur">
+            <a:extLst>
+              <a:ext uri="{FF2B5EF4-FFF2-40B4-BE49-F238E27FC236}">
+                <a16:creationId xmlns:a16="http://schemas.microsoft.com/office/drawing/2014/main" id="{3C924EDE-4019-4A49-A108-6854B34B2621}"/>
+              </a:ext>
+            </a:extLst>
+          </p:cNvPr>
+          <p:cNvPicPr>
+            <a:picLocks noChangeAspect="1"/>
+          </p:cNvPicPr>
+          <p:nvPr/>
+        </p:nvPicPr>
+        <p:blipFill>
+          <a:blip r:embed="rId2">
+            <a:extLst>
+              <a:ext uri="{28A0092B-C50C-407E-A947-70E740481C1C}">
+                <a14:useLocalDpi xmlns:a14="http://schemas.microsoft.com/office/drawing/2010/main" val="0"/>
+              </a:ext>
+              <a:ext uri="{96DAC541-7B7A-43D3-8B79-37D633B846F1}">
+                <asvg:svgBlip xmlns:asvg="http://schemas.microsoft.com/office/drawing/2016/SVG/main" r:embed="rId3"/>
+              </a:ext>
+            </a:extLst>
+          </a:blip>
+          <a:stretch>
+            <a:fillRect/>
+          </a:stretch>
+        </p:blipFill>
+        <p:spPr>
+          <a:xfrm>
+            <a:off x="4500664" y="2433239"/>
+            <a:ext cx="1029573" cy="1029573"/>
+          </a:xfrm>
+          <a:prstGeom prst="rect">
+            <a:avLst/>
+          </a:prstGeom>
+        </p:spPr>
+      </p:pic>
     </p:spTree>
     <p:extLst>
       <p:ext uri="{BB962C8B-B14F-4D97-AF65-F5344CB8AC3E}">

</xml_diff>